<commit_message>
updated presentation slides final
</commit_message>
<xml_diff>
--- a/final_paper/VLSI 1 Final Presentation.pptx
+++ b/final_paper/VLSI 1 Final Presentation.pptx
@@ -19,6 +19,7 @@
     <p:sldId id="264" r:id="rId14"/>
     <p:sldId id="265" r:id="rId15"/>
     <p:sldId id="266" r:id="rId16"/>
+    <p:sldId id="267" r:id="rId17"/>
   </p:sldIdLst>
   <p:sldSz cy="5143500" cx="9144000"/>
   <p:notesSz cy="9144000" cx="6858000"/>
@@ -600,7 +601,7 @@
   <p:cSld>
     <p:spTree>
       <p:nvGrpSpPr>
-        <p:cNvPr id="110" name="Shape 110"/>
+        <p:cNvPr id="111" name="Shape 111"/>
         <p:cNvGrpSpPr/>
         <p:nvPr/>
       </p:nvGrpSpPr>
@@ -614,7 +615,7 @@
       </p:grpSpPr>
       <p:sp>
         <p:nvSpPr>
-          <p:cNvPr id="111" name="Shape 111"/>
+          <p:cNvPr id="112" name="Shape 112"/>
           <p:cNvSpPr/>
           <p:nvPr>
             <p:ph idx="2" type="sldImg"/>
@@ -658,7 +659,112 @@
       </p:sp>
       <p:sp>
         <p:nvSpPr>
-          <p:cNvPr id="112" name="Shape 112"/>
+          <p:cNvPr id="113" name="Shape 113"/>
+          <p:cNvSpPr txBox="1"/>
+          <p:nvPr>
+            <p:ph idx="1" type="body"/>
+          </p:nvPr>
+        </p:nvSpPr>
+        <p:spPr>
+          <a:xfrm>
+            <a:off y="4343400" x="685800"/>
+            <a:ext cy="4114800" cx="5486399"/>
+          </a:xfrm>
+          <a:prstGeom prst="rect">
+            <a:avLst/>
+          </a:prstGeom>
+        </p:spPr>
+        <p:txBody>
+          <a:bodyPr bIns="91425" rIns="91425" lIns="91425" tIns="91425" anchor="t" anchorCtr="0">
+            <a:noAutofit/>
+          </a:bodyPr>
+          <a:lstStyle/>
+          <a:p>
+            <a:pPr>
+              <a:spcBef>
+                <a:spcPts val="0"/>
+              </a:spcBef>
+              <a:buNone/>
+            </a:pPr>
+            <a:r>
+              <a:t/>
+            </a:r>
+            <a:endParaRPr/>
+          </a:p>
+        </p:txBody>
+      </p:sp>
+    </p:spTree>
+  </p:cSld>
+  <p:clrMapOvr>
+    <a:masterClrMapping/>
+  </p:clrMapOvr>
+</p:notes>
+</file>
+
+<file path=ppt/notesSlides/notesSlide12.xml><?xml version="1.0" encoding="utf-8"?>
+<p:notes xmlns:a="http://schemas.openxmlformats.org/drawingml/2006/main" xmlns:r="http://schemas.openxmlformats.org/officeDocument/2006/relationships" xmlns:mc="http://schemas.openxmlformats.org/markup-compatibility/2006" xmlns:mv="urn:schemas-microsoft-com:mac:vml" xmlns:p="http://schemas.openxmlformats.org/presentationml/2006/main" xmlns:c="http://schemas.openxmlformats.org/drawingml/2006/chart" xmlns:dgm="http://schemas.openxmlformats.org/drawingml/2006/diagram" xmlns:o="urn:schemas-microsoft-com:office:office" xmlns:v="urn:schemas-microsoft-com:vml" xmlns:pvml="urn:schemas-microsoft-com:office:powerpoint" xmlns:com="http://schemas.openxmlformats.org/drawingml/2006/compatibility" xmlns:p14="http://schemas.microsoft.com/office/powerpoint/2010/main" showMasterSp="0" showMasterPhAnim="0">
+  <p:cSld>
+    <p:spTree>
+      <p:nvGrpSpPr>
+        <p:cNvPr id="116" name="Shape 116"/>
+        <p:cNvGrpSpPr/>
+        <p:nvPr/>
+      </p:nvGrpSpPr>
+      <p:grpSpPr>
+        <a:xfrm>
+          <a:off y="0" x="0"/>
+          <a:ext cy="0" cx="0"/>
+          <a:chOff y="0" x="0"/>
+          <a:chExt cy="0" cx="0"/>
+        </a:xfrm>
+      </p:grpSpPr>
+      <p:sp>
+        <p:nvSpPr>
+          <p:cNvPr id="117" name="Shape 117"/>
+          <p:cNvSpPr/>
+          <p:nvPr>
+            <p:ph idx="2" type="sldImg"/>
+          </p:nvPr>
+        </p:nvSpPr>
+        <p:spPr>
+          <a:xfrm>
+            <a:off y="685800" x="381187"/>
+            <a:ext cy="3429000" cx="6096299"/>
+          </a:xfrm>
+          <a:custGeom>
+            <a:pathLst>
+              <a:path w="120000" extrusionOk="0" h="120000">
+                <a:moveTo>
+                  <a:pt y="0" x="0"/>
+                </a:moveTo>
+                <a:lnTo>
+                  <a:pt y="0" x="120000"/>
+                </a:lnTo>
+                <a:lnTo>
+                  <a:pt y="120000" x="120000"/>
+                </a:lnTo>
+                <a:lnTo>
+                  <a:pt y="120000" x="0"/>
+                </a:lnTo>
+                <a:close/>
+              </a:path>
+            </a:pathLst>
+          </a:custGeom>
+          <a:noFill/>
+          <a:ln w="9525" cap="flat">
+            <a:solidFill>
+              <a:srgbClr val="000000"/>
+            </a:solidFill>
+            <a:prstDash val="solid"/>
+            <a:round/>
+            <a:headEnd w="med" len="med" type="none"/>
+            <a:tailEnd w="med" len="med" type="none"/>
+          </a:ln>
+        </p:spPr>
+      </p:sp>
+      <p:sp>
+        <p:nvSpPr>
+          <p:cNvPr id="118" name="Shape 118"/>
           <p:cNvSpPr txBox="1"/>
           <p:nvPr>
             <p:ph idx="1" type="body"/>
@@ -4169,7 +4275,7 @@
             </a:pPr>
             <a:r>
               <a:rPr lang="en"/>
-              <a:t>Future Work</a:t>
+              <a:t>Constraints	</a:t>
             </a:r>
           </a:p>
         </p:txBody>
@@ -4197,7 +4303,19 @@
           </a:bodyPr>
           <a:lstStyle/>
           <a:p>
-            <a:pPr rtl="0" lvl="0" indent="-419100" marL="457200">
+            <a:pPr rtl="0">
+              <a:spcBef>
+                <a:spcPts val="0"/>
+              </a:spcBef>
+              <a:buNone/>
+            </a:pPr>
+            <a:r>
+              <a:rPr lang="en"/>
+              <a:t>Software! </a:t>
+            </a:r>
+          </a:p>
+          <a:p>
+            <a:pPr rtl="0" lvl="0" indent="-406400" marL="457200">
               <a:spcBef>
                 <a:spcPts val="0"/>
               </a:spcBef>
@@ -4206,15 +4324,36 @@
               </a:buClr>
               <a:buSzPct val="100000"/>
               <a:buFont typeface="Arial"/>
-              <a:buAutoNum type="arabicParenR"/>
-            </a:pPr>
+              <a:buChar char="-"/>
+            </a:pPr>
+            <a:r>
+              <a:rPr sz="2800" lang="en"/>
+              <a:t>3D ICs are new technology</a:t>
+            </a:r>
+          </a:p>
+          <a:p>
+            <a:pPr rtl="0" lvl="0" indent="-419100" marL="457200">
+              <a:spcBef>
+                <a:spcPts val="0"/>
+              </a:spcBef>
+              <a:buClr>
+                <a:schemeClr val="dk1"/>
+              </a:buClr>
+              <a:buSzPct val="107142"/>
+              <a:buFont typeface="Arial"/>
+              <a:buChar char="-"/>
+            </a:pPr>
+            <a:r>
+              <a:rPr sz="2800" lang="en"/>
+              <a:t>NCSU 45NM 3DPDK only supports TSV-base</a:t>
+            </a:r>
             <a:r>
               <a:rPr lang="en"/>
-              <a:t>Software library that supports monolithic integration</a:t>
-            </a:r>
-          </a:p>
-          <a:p>
-            <a:pPr rtl="0" lvl="0" indent="-419100" marL="457200">
+              <a:t>d </a:t>
+            </a:r>
+          </a:p>
+          <a:p>
+            <a:pPr lvl="0" indent="-419100" marL="457200">
               <a:spcBef>
                 <a:spcPts val="0"/>
               </a:spcBef>
@@ -4223,28 +4362,11 @@
               </a:buClr>
               <a:buSzPct val="100000"/>
               <a:buFont typeface="Arial"/>
-              <a:buAutoNum type="arabicParenR"/>
+              <a:buChar char="-"/>
             </a:pPr>
             <a:r>
               <a:rPr lang="en"/>
-              <a:t>Additional cells</a:t>
-            </a:r>
-          </a:p>
-          <a:p>
-            <a:pPr lvl="0" indent="-419100" marL="457200">
-              <a:spcBef>
-                <a:spcPts val="0"/>
-              </a:spcBef>
-              <a:buClr>
-                <a:schemeClr val="dk1"/>
-              </a:buClr>
-              <a:buSzPct val="100000"/>
-              <a:buFont typeface="Arial"/>
-              <a:buAutoNum type="arabicParenR"/>
-            </a:pPr>
-            <a:r>
-              <a:rPr lang="en"/>
-              <a:t>Determine the average area improvement after routing overhead</a:t>
+              <a:t>Need more advanced tools to properly layout</a:t>
             </a:r>
           </a:p>
         </p:txBody>
@@ -4280,6 +4402,145 @@
       <p:sp>
         <p:nvSpPr>
           <p:cNvPr id="109" name="Shape 109"/>
+          <p:cNvSpPr txBox="1"/>
+          <p:nvPr>
+            <p:ph type="title"/>
+          </p:nvPr>
+        </p:nvSpPr>
+        <p:spPr>
+          <a:xfrm>
+            <a:off y="139527" x="457200"/>
+            <a:ext cy="857400" cx="8229600"/>
+          </a:xfrm>
+          <a:prstGeom prst="rect">
+            <a:avLst/>
+          </a:prstGeom>
+        </p:spPr>
+        <p:txBody>
+          <a:bodyPr bIns="91425" rIns="91425" lIns="91425" tIns="91425" anchor="b" anchorCtr="0">
+            <a:noAutofit/>
+          </a:bodyPr>
+          <a:lstStyle/>
+          <a:p>
+            <a:pPr>
+              <a:spcBef>
+                <a:spcPts val="0"/>
+              </a:spcBef>
+              <a:buNone/>
+            </a:pPr>
+            <a:r>
+              <a:rPr lang="en"/>
+              <a:t>Future Work</a:t>
+            </a:r>
+          </a:p>
+        </p:txBody>
+      </p:sp>
+      <p:sp>
+        <p:nvSpPr>
+          <p:cNvPr id="110" name="Shape 110"/>
+          <p:cNvSpPr txBox="1"/>
+          <p:nvPr>
+            <p:ph idx="1" type="body"/>
+          </p:nvPr>
+        </p:nvSpPr>
+        <p:spPr>
+          <a:xfrm>
+            <a:off y="1200150" x="457200"/>
+            <a:ext cy="3725699" cx="8229600"/>
+          </a:xfrm>
+          <a:prstGeom prst="rect">
+            <a:avLst/>
+          </a:prstGeom>
+        </p:spPr>
+        <p:txBody>
+          <a:bodyPr bIns="91425" rIns="91425" lIns="91425" tIns="91425" anchor="t" anchorCtr="0">
+            <a:noAutofit/>
+          </a:bodyPr>
+          <a:lstStyle/>
+          <a:p>
+            <a:pPr rtl="0" lvl="0" indent="-419100" marL="457200">
+              <a:spcBef>
+                <a:spcPts val="0"/>
+              </a:spcBef>
+              <a:buClr>
+                <a:schemeClr val="dk1"/>
+              </a:buClr>
+              <a:buSzPct val="100000"/>
+              <a:buFont typeface="Arial"/>
+              <a:buAutoNum type="arabicParenR"/>
+            </a:pPr>
+            <a:r>
+              <a:rPr lang="en"/>
+              <a:t>Software library that supports monolithic integration</a:t>
+            </a:r>
+          </a:p>
+          <a:p>
+            <a:pPr rtl="0" lvl="0" indent="-419100" marL="457200">
+              <a:spcBef>
+                <a:spcPts val="0"/>
+              </a:spcBef>
+              <a:buClr>
+                <a:schemeClr val="dk1"/>
+              </a:buClr>
+              <a:buSzPct val="100000"/>
+              <a:buFont typeface="Arial"/>
+              <a:buAutoNum type="arabicParenR"/>
+            </a:pPr>
+            <a:r>
+              <a:rPr lang="en"/>
+              <a:t>Additional cells</a:t>
+            </a:r>
+          </a:p>
+          <a:p>
+            <a:pPr lvl="0" indent="-419100" marL="457200">
+              <a:spcBef>
+                <a:spcPts val="0"/>
+              </a:spcBef>
+              <a:buClr>
+                <a:schemeClr val="dk1"/>
+              </a:buClr>
+              <a:buSzPct val="100000"/>
+              <a:buFont typeface="Arial"/>
+              <a:buAutoNum type="arabicParenR"/>
+            </a:pPr>
+            <a:r>
+              <a:rPr lang="en"/>
+              <a:t>Determine the average area improvement after routing overhead</a:t>
+            </a:r>
+          </a:p>
+        </p:txBody>
+      </p:sp>
+    </p:spTree>
+  </p:cSld>
+  <p:clrMapOvr>
+    <a:masterClrMapping/>
+  </p:clrMapOvr>
+  <p:transition spd="slow">
+    <p:cut/>
+  </p:transition>
+</p:sld>
+</file>
+
+<file path=ppt/slides/slide12.xml><?xml version="1.0" encoding="utf-8"?>
+<p:sld xmlns:a="http://schemas.openxmlformats.org/drawingml/2006/main" xmlns:r="http://schemas.openxmlformats.org/officeDocument/2006/relationships" xmlns:mc="http://schemas.openxmlformats.org/markup-compatibility/2006" xmlns:mv="urn:schemas-microsoft-com:mac:vml" xmlns:p="http://schemas.openxmlformats.org/presentationml/2006/main" xmlns:c="http://schemas.openxmlformats.org/drawingml/2006/chart" xmlns:dgm="http://schemas.openxmlformats.org/drawingml/2006/diagram" xmlns:o="urn:schemas-microsoft-com:office:office" xmlns:v="urn:schemas-microsoft-com:vml" xmlns:pvml="urn:schemas-microsoft-com:office:powerpoint" xmlns:com="http://schemas.openxmlformats.org/drawingml/2006/compatibility" xmlns:p14="http://schemas.microsoft.com/office/powerpoint/2010/main">
+  <p:cSld>
+    <p:spTree>
+      <p:nvGrpSpPr>
+        <p:cNvPr id="114" name="Shape 114"/>
+        <p:cNvGrpSpPr/>
+        <p:nvPr/>
+      </p:nvGrpSpPr>
+      <p:grpSpPr>
+        <a:xfrm>
+          <a:off y="0" x="0"/>
+          <a:ext cy="0" cx="0"/>
+          <a:chOff y="0" x="0"/>
+          <a:chExt cy="0" cx="0"/>
+        </a:xfrm>
+      </p:grpSpPr>
+      <p:sp>
+        <p:nvSpPr>
+          <p:cNvPr id="115" name="Shape 115"/>
           <p:cNvSpPr txBox="1"/>
           <p:nvPr>
             <p:ph type="title"/>
@@ -5635,102 +5896,39 @@
             </a:pPr>
             <a:r>
               <a:rPr lang="en"/>
-              <a:t>Constraints	</a:t>
+              <a:t>Comparison of Cells</a:t>
             </a:r>
           </a:p>
         </p:txBody>
       </p:sp>
-      <p:sp>
-        <p:nvSpPr>
+      <p:pic>
+        <p:nvPicPr>
           <p:cNvPr id="98" name="Shape 98"/>
-          <p:cNvSpPr txBox="1"/>
-          <p:nvPr>
-            <p:ph idx="1" type="body"/>
-          </p:nvPr>
-        </p:nvSpPr>
-        <p:spPr>
-          <a:xfrm>
-            <a:off y="1200150" x="457200"/>
-            <a:ext cy="3725699" cx="8229600"/>
+          <p:cNvPicPr preferRelativeResize="0"/>
+          <p:nvPr/>
+        </p:nvPicPr>
+        <p:blipFill>
+          <a:blip r:embed="rId3">
+            <a:alphaModFix/>
+          </a:blip>
+          <a:stretch>
+            <a:fillRect/>
+          </a:stretch>
+        </p:blipFill>
+        <p:spPr>
+          <a:xfrm>
+            <a:off y="1602725" x="489900"/>
+            <a:ext cy="3192950" cx="8150374"/>
           </a:xfrm>
           <a:prstGeom prst="rect">
             <a:avLst/>
           </a:prstGeom>
-        </p:spPr>
-        <p:txBody>
-          <a:bodyPr bIns="91425" rIns="91425" lIns="91425" tIns="91425" anchor="t" anchorCtr="0">
-            <a:noAutofit/>
-          </a:bodyPr>
-          <a:lstStyle/>
-          <a:p>
-            <a:pPr rtl="0">
-              <a:spcBef>
-                <a:spcPts val="0"/>
-              </a:spcBef>
-              <a:buNone/>
-            </a:pPr>
-            <a:r>
-              <a:rPr lang="en"/>
-              <a:t>Software! </a:t>
-            </a:r>
-          </a:p>
-          <a:p>
-            <a:pPr rtl="0" lvl="0" indent="-406400" marL="457200">
-              <a:spcBef>
-                <a:spcPts val="0"/>
-              </a:spcBef>
-              <a:buClr>
-                <a:schemeClr val="dk1"/>
-              </a:buClr>
-              <a:buSzPct val="100000"/>
-              <a:buFont typeface="Arial"/>
-              <a:buChar char="-"/>
-            </a:pPr>
-            <a:r>
-              <a:rPr sz="2800" lang="en"/>
-              <a:t>3D ICs are new technology</a:t>
-            </a:r>
-          </a:p>
-          <a:p>
-            <a:pPr rtl="0" lvl="0" indent="-419100" marL="457200">
-              <a:spcBef>
-                <a:spcPts val="0"/>
-              </a:spcBef>
-              <a:buClr>
-                <a:schemeClr val="dk1"/>
-              </a:buClr>
-              <a:buSzPct val="107142"/>
-              <a:buFont typeface="Arial"/>
-              <a:buChar char="-"/>
-            </a:pPr>
-            <a:r>
-              <a:rPr sz="2800" lang="en"/>
-              <a:t>NCSU 45NM 3DPDK only supports TSV-base</a:t>
-            </a:r>
-            <a:r>
-              <a:rPr lang="en"/>
-              <a:t>d </a:t>
-            </a:r>
-          </a:p>
-          <a:p>
-            <a:pPr lvl="0" indent="-419100" marL="457200">
-              <a:spcBef>
-                <a:spcPts val="0"/>
-              </a:spcBef>
-              <a:buClr>
-                <a:schemeClr val="dk1"/>
-              </a:buClr>
-              <a:buSzPct val="100000"/>
-              <a:buFont typeface="Arial"/>
-              <a:buChar char="-"/>
-            </a:pPr>
-            <a:r>
-              <a:rPr lang="en"/>
-              <a:t>Need more advanced tools to properly layout</a:t>
-            </a:r>
-          </a:p>
-        </p:txBody>
-      </p:sp>
+          <a:noFill/>
+          <a:ln>
+            <a:noFill/>
+          </a:ln>
+        </p:spPr>
+      </p:pic>
     </p:spTree>
   </p:cSld>
   <p:clrMapOvr>
@@ -6060,6 +6258,283 @@
 </file>
 
 <file path=ppt/theme/theme2.xml><?xml version="1.0" encoding="utf-8"?>
+<a:theme xmlns:a="http://schemas.openxmlformats.org/drawingml/2006/main" xmlns:r="http://schemas.openxmlformats.org/officeDocument/2006/relationships" name="Custom Theme">
+  <a:themeElements>
+    <a:clrScheme name="Default">
+      <a:dk1>
+        <a:srgbClr val="000000"/>
+      </a:dk1>
+      <a:lt1>
+        <a:srgbClr val="FFFFFF"/>
+      </a:lt1>
+      <a:dk2>
+        <a:srgbClr val="158158"/>
+      </a:dk2>
+      <a:lt2>
+        <a:srgbClr val="F3F3F3"/>
+      </a:lt2>
+      <a:accent1>
+        <a:srgbClr val="058DC7"/>
+      </a:accent1>
+      <a:accent2>
+        <a:srgbClr val="50B432"/>
+      </a:accent2>
+      <a:accent3>
+        <a:srgbClr val="ED561B"/>
+      </a:accent3>
+      <a:accent4>
+        <a:srgbClr val="EDEF00"/>
+      </a:accent4>
+      <a:accent5>
+        <a:srgbClr val="24CBE5"/>
+      </a:accent5>
+      <a:accent6>
+        <a:srgbClr val="64E572"/>
+      </a:accent6>
+      <a:hlink>
+        <a:srgbClr val="2200CC"/>
+      </a:hlink>
+      <a:folHlink>
+        <a:srgbClr val="551A8B"/>
+      </a:folHlink>
+    </a:clrScheme>
+    <a:fontScheme name="Office">
+      <a:majorFont>
+        <a:latin typeface="Arial"/>
+        <a:ea typeface=""/>
+        <a:cs typeface=""/>
+        <a:font typeface="ＭＳ Ｐゴシック" script="Jpan"/>
+        <a:font typeface="맑은 고딕" script="Hang"/>
+        <a:font typeface="宋体" script="Hans"/>
+        <a:font typeface="新細明體" script="Hant"/>
+        <a:font typeface="Times New Roman" script="Arab"/>
+        <a:font typeface="Times New Roman" script="Hebr"/>
+        <a:font typeface="Angsana New" script="Thai"/>
+        <a:font typeface="Nyala" script="Ethi"/>
+        <a:font typeface="Vrinda" script="Beng"/>
+        <a:font typeface="Shruti" script="Gujr"/>
+        <a:font typeface="MoolBoran" script="Khmr"/>
+        <a:font typeface="Tunga" script="Knda"/>
+        <a:font typeface="Raavi" script="Guru"/>
+        <a:font typeface="Euphemia" script="Cans"/>
+        <a:font typeface="Plantagenet Cherokee" script="Cher"/>
+        <a:font typeface="Microsoft Yi Baiti" script="Yiii"/>
+        <a:font typeface="Microsoft Himalaya" script="Tibt"/>
+        <a:font typeface="MV Boli" script="Thaa"/>
+        <a:font typeface="Mangal" script="Deva"/>
+        <a:font typeface="Gautami" script="Telu"/>
+        <a:font typeface="Latha" script="Taml"/>
+        <a:font typeface="Estrangelo Edessa" script="Syrc"/>
+        <a:font typeface="Kalinga" script="Orya"/>
+        <a:font typeface="Kartika" script="Mlym"/>
+        <a:font typeface="DokChampa" script="Laoo"/>
+        <a:font typeface="Iskoola Pota" script="Sinh"/>
+        <a:font typeface="Mongolian Baiti" script="Mong"/>
+        <a:font typeface="Times New Roman" script="Viet"/>
+        <a:font typeface="Microsoft Uighur" script="Uigh"/>
+      </a:majorFont>
+      <a:minorFont>
+        <a:latin typeface="Arial"/>
+        <a:ea typeface=""/>
+        <a:cs typeface=""/>
+        <a:font typeface="ＭＳ Ｐゴシック" script="Jpan"/>
+        <a:font typeface="맑은 고딕" script="Hang"/>
+        <a:font typeface="宋体" script="Hans"/>
+        <a:font typeface="新細明體" script="Hant"/>
+        <a:font typeface="Times New Roman" script="Arab"/>
+        <a:font typeface="Times New Roman" script="Hebr"/>
+        <a:font typeface="Angsana New" script="Thai"/>
+        <a:font typeface="Nyala" script="Ethi"/>
+        <a:font typeface="Vrinda" script="Beng"/>
+        <a:font typeface="Shruti" script="Gujr"/>
+        <a:font typeface="MoolBoran" script="Khmr"/>
+        <a:font typeface="Tunga" script="Knda"/>
+        <a:font typeface="Raavi" script="Guru"/>
+        <a:font typeface="Euphemia" script="Cans"/>
+        <a:font typeface="Plantagenet Cherokee" script="Cher"/>
+        <a:font typeface="Microsoft Yi Baiti" script="Yiii"/>
+        <a:font typeface="Microsoft Himalaya" script="Tibt"/>
+        <a:font typeface="MV Boli" script="Thaa"/>
+        <a:font typeface="Mangal" script="Deva"/>
+        <a:font typeface="Gautami" script="Telu"/>
+        <a:font typeface="Latha" script="Taml"/>
+        <a:font typeface="Estrangelo Edessa" script="Syrc"/>
+        <a:font typeface="Kalinga" script="Orya"/>
+        <a:font typeface="Kartika" script="Mlym"/>
+        <a:font typeface="DokChampa" script="Laoo"/>
+        <a:font typeface="Iskoola Pota" script="Sinh"/>
+        <a:font typeface="Mongolian Baiti" script="Mong"/>
+        <a:font typeface="Times New Roman" script="Viet"/>
+        <a:font typeface="Microsoft Uighur" script="Uigh"/>
+      </a:minorFont>
+    </a:fontScheme>
+    <a:fmtScheme name="Office">
+      <a:fillStyleLst>
+        <a:solidFill>
+          <a:schemeClr val="phClr"/>
+        </a:solidFill>
+        <a:gradFill rotWithShape="1">
+          <a:gsLst>
+            <a:gs pos="0">
+              <a:schemeClr val="phClr">
+                <a:tint val="50000"/>
+                <a:satMod val="300000"/>
+              </a:schemeClr>
+            </a:gs>
+            <a:gs pos="35000">
+              <a:schemeClr val="phClr">
+                <a:tint val="37000"/>
+                <a:satMod val="300000"/>
+              </a:schemeClr>
+            </a:gs>
+            <a:gs pos="100000">
+              <a:schemeClr val="phClr">
+                <a:tint val="15000"/>
+                <a:satMod val="350000"/>
+              </a:schemeClr>
+            </a:gs>
+          </a:gsLst>
+          <a:lin ang="16200000" scaled="1"/>
+        </a:gradFill>
+        <a:gradFill rotWithShape="1">
+          <a:gsLst>
+            <a:gs pos="0">
+              <a:schemeClr val="phClr">
+                <a:tint val="100000"/>
+                <a:shade val="100000"/>
+                <a:satMod val="130000"/>
+              </a:schemeClr>
+            </a:gs>
+            <a:gs pos="100000">
+              <a:schemeClr val="phClr">
+                <a:tint val="50000"/>
+                <a:shade val="100000"/>
+                <a:satMod val="350000"/>
+              </a:schemeClr>
+            </a:gs>
+          </a:gsLst>
+          <a:lin ang="16200000" scaled="0"/>
+        </a:gradFill>
+      </a:fillStyleLst>
+      <a:lnStyleLst>
+        <a:ln w="9525" algn="ctr" cap="flat" cmpd="sng">
+          <a:solidFill>
+            <a:schemeClr val="phClr">
+              <a:shade val="95000"/>
+              <a:satMod val="105000"/>
+            </a:schemeClr>
+          </a:solidFill>
+          <a:prstDash val="solid"/>
+        </a:ln>
+        <a:ln w="25400" algn="ctr" cap="flat" cmpd="sng">
+          <a:solidFill>
+            <a:schemeClr val="phClr"/>
+          </a:solidFill>
+          <a:prstDash val="solid"/>
+        </a:ln>
+        <a:ln w="38100" algn="ctr" cap="flat" cmpd="sng">
+          <a:solidFill>
+            <a:schemeClr val="phClr"/>
+          </a:solidFill>
+          <a:prstDash val="solid"/>
+        </a:ln>
+      </a:lnStyleLst>
+      <a:effectStyleLst>
+        <a:effectStyle>
+          <a:effectLst>
+            <a:outerShdw rotWithShape="0" dir="5400000" blurRad="40000" dist="20000">
+              <a:srgbClr val="000000">
+                <a:alpha val="38000"/>
+              </a:srgbClr>
+            </a:outerShdw>
+          </a:effectLst>
+        </a:effectStyle>
+        <a:effectStyle>
+          <a:effectLst>
+            <a:outerShdw rotWithShape="0" dir="5400000" blurRad="40000" dist="23000">
+              <a:srgbClr val="000000">
+                <a:alpha val="35000"/>
+              </a:srgbClr>
+            </a:outerShdw>
+          </a:effectLst>
+        </a:effectStyle>
+        <a:effectStyle>
+          <a:effectLst>
+            <a:outerShdw rotWithShape="0" dir="5400000" blurRad="40000" dist="23000">
+              <a:srgbClr val="000000">
+                <a:alpha val="35000"/>
+              </a:srgbClr>
+            </a:outerShdw>
+          </a:effectLst>
+          <a:scene3d>
+            <a:camera prst="orthographicFront">
+              <a:rot rev="0" lon="0" lat="0"/>
+            </a:camera>
+            <a:lightRig dir="t" rig="threePt">
+              <a:rot rev="1200000" lon="0" lat="0"/>
+            </a:lightRig>
+          </a:scene3d>
+          <a:sp3d>
+            <a:bevelT w="63500" h="25400"/>
+          </a:sp3d>
+        </a:effectStyle>
+      </a:effectStyleLst>
+      <a:bgFillStyleLst>
+        <a:solidFill>
+          <a:schemeClr val="phClr"/>
+        </a:solidFill>
+        <a:gradFill rotWithShape="1">
+          <a:gsLst>
+            <a:gs pos="0">
+              <a:schemeClr val="phClr">
+                <a:tint val="40000"/>
+                <a:satMod val="350000"/>
+              </a:schemeClr>
+            </a:gs>
+            <a:gs pos="40000">
+              <a:schemeClr val="phClr">
+                <a:tint val="45000"/>
+                <a:shade val="99000"/>
+                <a:satMod val="350000"/>
+              </a:schemeClr>
+            </a:gs>
+            <a:gs pos="100000">
+              <a:schemeClr val="phClr">
+                <a:shade val="20000"/>
+                <a:satMod val="255000"/>
+              </a:schemeClr>
+            </a:gs>
+          </a:gsLst>
+          <a:path path="circle">
+            <a:fillToRect t="-80000" b="180000" r="50000" l="50000"/>
+          </a:path>
+        </a:gradFill>
+        <a:gradFill rotWithShape="1">
+          <a:gsLst>
+            <a:gs pos="0">
+              <a:schemeClr val="phClr">
+                <a:tint val="80000"/>
+                <a:satMod val="300000"/>
+              </a:schemeClr>
+            </a:gs>
+            <a:gs pos="100000">
+              <a:schemeClr val="phClr">
+                <a:shade val="30000"/>
+                <a:satMod val="200000"/>
+              </a:schemeClr>
+            </a:gs>
+          </a:gsLst>
+          <a:path path="circle">
+            <a:fillToRect t="50000" b="50000" r="50000" l="50000"/>
+          </a:path>
+        </a:gradFill>
+      </a:bgFillStyleLst>
+    </a:fmtScheme>
+  </a:themeElements>
+</a:theme>
+</file>
+
+<file path=ppt/theme/theme3.xml><?xml version="1.0" encoding="utf-8"?>
 <a:theme xmlns:a="http://schemas.openxmlformats.org/drawingml/2006/main" xmlns:r="http://schemas.openxmlformats.org/officeDocument/2006/relationships" name="label">
   <a:themeElements>
     <a:clrScheme name="Custom 352">
@@ -6334,281 +6809,4 @@
     </a:fmtScheme>
   </a:themeElements>
 </a:theme>
-</file>
-
-<file path=ppt/theme/theme3.xml><?xml version="1.0" encoding="utf-8"?>
-<a:theme xmlns:a="http://schemas.openxmlformats.org/drawingml/2006/main" xmlns:r="http://schemas.openxmlformats.org/officeDocument/2006/relationships" name="Custom Theme">
-  <a:themeElements>
-    <a:clrScheme name="Default">
-      <a:dk1>
-        <a:srgbClr val="000000"/>
-      </a:dk1>
-      <a:lt1>
-        <a:srgbClr val="FFFFFF"/>
-      </a:lt1>
-      <a:dk2>
-        <a:srgbClr val="158158"/>
-      </a:dk2>
-      <a:lt2>
-        <a:srgbClr val="F3F3F3"/>
-      </a:lt2>
-      <a:accent1>
-        <a:srgbClr val="058DC7"/>
-      </a:accent1>
-      <a:accent2>
-        <a:srgbClr val="50B432"/>
-      </a:accent2>
-      <a:accent3>
-        <a:srgbClr val="ED561B"/>
-      </a:accent3>
-      <a:accent4>
-        <a:srgbClr val="EDEF00"/>
-      </a:accent4>
-      <a:accent5>
-        <a:srgbClr val="24CBE5"/>
-      </a:accent5>
-      <a:accent6>
-        <a:srgbClr val="64E572"/>
-      </a:accent6>
-      <a:hlink>
-        <a:srgbClr val="2200CC"/>
-      </a:hlink>
-      <a:folHlink>
-        <a:srgbClr val="551A8B"/>
-      </a:folHlink>
-    </a:clrScheme>
-    <a:fontScheme name="Office">
-      <a:majorFont>
-        <a:latin typeface="Arial"/>
-        <a:ea typeface=""/>
-        <a:cs typeface=""/>
-        <a:font typeface="ＭＳ Ｐゴシック" script="Jpan"/>
-        <a:font typeface="맑은 고딕" script="Hang"/>
-        <a:font typeface="宋体" script="Hans"/>
-        <a:font typeface="新細明體" script="Hant"/>
-        <a:font typeface="Times New Roman" script="Arab"/>
-        <a:font typeface="Times New Roman" script="Hebr"/>
-        <a:font typeface="Angsana New" script="Thai"/>
-        <a:font typeface="Nyala" script="Ethi"/>
-        <a:font typeface="Vrinda" script="Beng"/>
-        <a:font typeface="Shruti" script="Gujr"/>
-        <a:font typeface="MoolBoran" script="Khmr"/>
-        <a:font typeface="Tunga" script="Knda"/>
-        <a:font typeface="Raavi" script="Guru"/>
-        <a:font typeface="Euphemia" script="Cans"/>
-        <a:font typeface="Plantagenet Cherokee" script="Cher"/>
-        <a:font typeface="Microsoft Yi Baiti" script="Yiii"/>
-        <a:font typeface="Microsoft Himalaya" script="Tibt"/>
-        <a:font typeface="MV Boli" script="Thaa"/>
-        <a:font typeface="Mangal" script="Deva"/>
-        <a:font typeface="Gautami" script="Telu"/>
-        <a:font typeface="Latha" script="Taml"/>
-        <a:font typeface="Estrangelo Edessa" script="Syrc"/>
-        <a:font typeface="Kalinga" script="Orya"/>
-        <a:font typeface="Kartika" script="Mlym"/>
-        <a:font typeface="DokChampa" script="Laoo"/>
-        <a:font typeface="Iskoola Pota" script="Sinh"/>
-        <a:font typeface="Mongolian Baiti" script="Mong"/>
-        <a:font typeface="Times New Roman" script="Viet"/>
-        <a:font typeface="Microsoft Uighur" script="Uigh"/>
-      </a:majorFont>
-      <a:minorFont>
-        <a:latin typeface="Arial"/>
-        <a:ea typeface=""/>
-        <a:cs typeface=""/>
-        <a:font typeface="ＭＳ Ｐゴシック" script="Jpan"/>
-        <a:font typeface="맑은 고딕" script="Hang"/>
-        <a:font typeface="宋体" script="Hans"/>
-        <a:font typeface="新細明體" script="Hant"/>
-        <a:font typeface="Times New Roman" script="Arab"/>
-        <a:font typeface="Times New Roman" script="Hebr"/>
-        <a:font typeface="Angsana New" script="Thai"/>
-        <a:font typeface="Nyala" script="Ethi"/>
-        <a:font typeface="Vrinda" script="Beng"/>
-        <a:font typeface="Shruti" script="Gujr"/>
-        <a:font typeface="MoolBoran" script="Khmr"/>
-        <a:font typeface="Tunga" script="Knda"/>
-        <a:font typeface="Raavi" script="Guru"/>
-        <a:font typeface="Euphemia" script="Cans"/>
-        <a:font typeface="Plantagenet Cherokee" script="Cher"/>
-        <a:font typeface="Microsoft Yi Baiti" script="Yiii"/>
-        <a:font typeface="Microsoft Himalaya" script="Tibt"/>
-        <a:font typeface="MV Boli" script="Thaa"/>
-        <a:font typeface="Mangal" script="Deva"/>
-        <a:font typeface="Gautami" script="Telu"/>
-        <a:font typeface="Latha" script="Taml"/>
-        <a:font typeface="Estrangelo Edessa" script="Syrc"/>
-        <a:font typeface="Kalinga" script="Orya"/>
-        <a:font typeface="Kartika" script="Mlym"/>
-        <a:font typeface="DokChampa" script="Laoo"/>
-        <a:font typeface="Iskoola Pota" script="Sinh"/>
-        <a:font typeface="Mongolian Baiti" script="Mong"/>
-        <a:font typeface="Times New Roman" script="Viet"/>
-        <a:font typeface="Microsoft Uighur" script="Uigh"/>
-      </a:minorFont>
-    </a:fontScheme>
-    <a:fmtScheme name="Office">
-      <a:fillStyleLst>
-        <a:solidFill>
-          <a:schemeClr val="phClr"/>
-        </a:solidFill>
-        <a:gradFill rotWithShape="1">
-          <a:gsLst>
-            <a:gs pos="0">
-              <a:schemeClr val="phClr">
-                <a:tint val="50000"/>
-                <a:satMod val="300000"/>
-              </a:schemeClr>
-            </a:gs>
-            <a:gs pos="35000">
-              <a:schemeClr val="phClr">
-                <a:tint val="37000"/>
-                <a:satMod val="300000"/>
-              </a:schemeClr>
-            </a:gs>
-            <a:gs pos="100000">
-              <a:schemeClr val="phClr">
-                <a:tint val="15000"/>
-                <a:satMod val="350000"/>
-              </a:schemeClr>
-            </a:gs>
-          </a:gsLst>
-          <a:lin ang="16200000" scaled="1"/>
-        </a:gradFill>
-        <a:gradFill rotWithShape="1">
-          <a:gsLst>
-            <a:gs pos="0">
-              <a:schemeClr val="phClr">
-                <a:tint val="100000"/>
-                <a:shade val="100000"/>
-                <a:satMod val="130000"/>
-              </a:schemeClr>
-            </a:gs>
-            <a:gs pos="100000">
-              <a:schemeClr val="phClr">
-                <a:tint val="50000"/>
-                <a:shade val="100000"/>
-                <a:satMod val="350000"/>
-              </a:schemeClr>
-            </a:gs>
-          </a:gsLst>
-          <a:lin ang="16200000" scaled="0"/>
-        </a:gradFill>
-      </a:fillStyleLst>
-      <a:lnStyleLst>
-        <a:ln w="9525" algn="ctr" cap="flat" cmpd="sng">
-          <a:solidFill>
-            <a:schemeClr val="phClr">
-              <a:shade val="95000"/>
-              <a:satMod val="105000"/>
-            </a:schemeClr>
-          </a:solidFill>
-          <a:prstDash val="solid"/>
-        </a:ln>
-        <a:ln w="25400" algn="ctr" cap="flat" cmpd="sng">
-          <a:solidFill>
-            <a:schemeClr val="phClr"/>
-          </a:solidFill>
-          <a:prstDash val="solid"/>
-        </a:ln>
-        <a:ln w="38100" algn="ctr" cap="flat" cmpd="sng">
-          <a:solidFill>
-            <a:schemeClr val="phClr"/>
-          </a:solidFill>
-          <a:prstDash val="solid"/>
-        </a:ln>
-      </a:lnStyleLst>
-      <a:effectStyleLst>
-        <a:effectStyle>
-          <a:effectLst>
-            <a:outerShdw rotWithShape="0" dir="5400000" blurRad="40000" dist="20000">
-              <a:srgbClr val="000000">
-                <a:alpha val="38000"/>
-              </a:srgbClr>
-            </a:outerShdw>
-          </a:effectLst>
-        </a:effectStyle>
-        <a:effectStyle>
-          <a:effectLst>
-            <a:outerShdw rotWithShape="0" dir="5400000" blurRad="40000" dist="23000">
-              <a:srgbClr val="000000">
-                <a:alpha val="35000"/>
-              </a:srgbClr>
-            </a:outerShdw>
-          </a:effectLst>
-        </a:effectStyle>
-        <a:effectStyle>
-          <a:effectLst>
-            <a:outerShdw rotWithShape="0" dir="5400000" blurRad="40000" dist="23000">
-              <a:srgbClr val="000000">
-                <a:alpha val="35000"/>
-              </a:srgbClr>
-            </a:outerShdw>
-          </a:effectLst>
-          <a:scene3d>
-            <a:camera prst="orthographicFront">
-              <a:rot rev="0" lon="0" lat="0"/>
-            </a:camera>
-            <a:lightRig dir="t" rig="threePt">
-              <a:rot rev="1200000" lon="0" lat="0"/>
-            </a:lightRig>
-          </a:scene3d>
-          <a:sp3d>
-            <a:bevelT w="63500" h="25400"/>
-          </a:sp3d>
-        </a:effectStyle>
-      </a:effectStyleLst>
-      <a:bgFillStyleLst>
-        <a:solidFill>
-          <a:schemeClr val="phClr"/>
-        </a:solidFill>
-        <a:gradFill rotWithShape="1">
-          <a:gsLst>
-            <a:gs pos="0">
-              <a:schemeClr val="phClr">
-                <a:tint val="40000"/>
-                <a:satMod val="350000"/>
-              </a:schemeClr>
-            </a:gs>
-            <a:gs pos="40000">
-              <a:schemeClr val="phClr">
-                <a:tint val="45000"/>
-                <a:shade val="99000"/>
-                <a:satMod val="350000"/>
-              </a:schemeClr>
-            </a:gs>
-            <a:gs pos="100000">
-              <a:schemeClr val="phClr">
-                <a:shade val="20000"/>
-                <a:satMod val="255000"/>
-              </a:schemeClr>
-            </a:gs>
-          </a:gsLst>
-          <a:path path="circle">
-            <a:fillToRect t="-80000" b="180000" r="50000" l="50000"/>
-          </a:path>
-        </a:gradFill>
-        <a:gradFill rotWithShape="1">
-          <a:gsLst>
-            <a:gs pos="0">
-              <a:schemeClr val="phClr">
-                <a:tint val="80000"/>
-                <a:satMod val="300000"/>
-              </a:schemeClr>
-            </a:gs>
-            <a:gs pos="100000">
-              <a:schemeClr val="phClr">
-                <a:shade val="30000"/>
-                <a:satMod val="200000"/>
-              </a:schemeClr>
-            </a:gs>
-          </a:gsLst>
-          <a:path path="circle">
-            <a:fillToRect t="50000" b="50000" r="50000" l="50000"/>
-          </a:path>
-        </a:gradFill>
-      </a:bgFillStyleLst>
-    </a:fmtScheme>
-  </a:themeElements>
-</a:theme>
 </file>
</xml_diff>